<commit_message>
replaces older PPTs with newer ones
</commit_message>
<xml_diff>
--- a/1-csharp/MarksCodeAndPPTs/DotNetPPTs/D3_.NET_BoxingAndUnboxing.pptx
+++ b/1-csharp/MarksCodeAndPPTs/DotNetPPTs/D3_.NET_BoxingAndUnboxing.pptx
@@ -369,7 +369,7 @@
           <a:p>
             <a:fld id="{9184DA70-C731-4C70-880D-CCD4705E623C}" type="datetime1">
               <a:rPr lang="en-US" smtClean="0"/>
-              <a:t>3/11/2020</a:t>
+              <a:t>3/12/2020</a:t>
             </a:fld>
             <a:endParaRPr lang="en-US" dirty="0"/>
           </a:p>
@@ -557,7 +557,7 @@
           <a:p>
             <a:fld id="{B612A279-0833-481D-8C56-F67FD0AC6C50}" type="datetime1">
               <a:rPr lang="en-US" smtClean="0"/>
-              <a:t>3/11/2020</a:t>
+              <a:t>3/12/2020</a:t>
             </a:fld>
             <a:endParaRPr lang="en-US" dirty="0"/>
           </a:p>
@@ -799,7 +799,7 @@
           <a:p>
             <a:fld id="{6587DA83-5663-4C9C-B9AA-0B40A3DAFF81}" type="datetime1">
               <a:rPr lang="en-US" smtClean="0"/>
-              <a:t>3/11/2020</a:t>
+              <a:t>3/12/2020</a:t>
             </a:fld>
             <a:endParaRPr lang="en-US" dirty="0"/>
           </a:p>
@@ -987,7 +987,7 @@
           <a:p>
             <a:fld id="{4BE1D723-8F53-4F53-90B0-1982A396982E}" type="datetime1">
               <a:rPr lang="en-US" smtClean="0"/>
-              <a:t>3/11/2020</a:t>
+              <a:t>3/12/2020</a:t>
             </a:fld>
             <a:endParaRPr lang="en-US" dirty="0"/>
           </a:p>
@@ -1360,7 +1360,7 @@
           <a:p>
             <a:fld id="{97669AF7-7BEB-44E4-9852-375E34362B5B}" type="datetime1">
               <a:rPr lang="en-US" smtClean="0"/>
-              <a:t>3/11/2020</a:t>
+              <a:t>3/12/2020</a:t>
             </a:fld>
             <a:endParaRPr lang="en-US" dirty="0"/>
           </a:p>
@@ -1615,7 +1615,7 @@
           <a:p>
             <a:fld id="{BAAAC38D-0552-4C82-B593-E6124DFADBE2}" type="datetime1">
               <a:rPr lang="en-US" smtClean="0"/>
-              <a:t>3/11/2020</a:t>
+              <a:t>3/12/2020</a:t>
             </a:fld>
             <a:endParaRPr lang="en-US" dirty="0"/>
           </a:p>
@@ -2012,7 +2012,7 @@
           <a:p>
             <a:fld id="{D9DF0F1C-5577-4ACB-BB62-DF8F3C494C7E}" type="datetime1">
               <a:rPr lang="en-US" smtClean="0"/>
-              <a:t>3/11/2020</a:t>
+              <a:t>3/12/2020</a:t>
             </a:fld>
             <a:endParaRPr lang="en-US" dirty="0"/>
           </a:p>
@@ -2148,7 +2148,7 @@
           <a:p>
             <a:fld id="{1775B394-D9F9-4F0C-B15D-605F45CB9E9F}" type="datetime1">
               <a:rPr lang="en-US" smtClean="0"/>
-              <a:t>3/11/2020</a:t>
+              <a:t>3/12/2020</a:t>
             </a:fld>
             <a:endParaRPr lang="en-US" dirty="0"/>
           </a:p>
@@ -2305,7 +2305,7 @@
           <a:p>
             <a:fld id="{39667345-2558-425A-8533-9BFDBCE15005}" type="datetime1">
               <a:rPr lang="en-US" smtClean="0"/>
-              <a:t>3/11/2020</a:t>
+              <a:t>3/12/2020</a:t>
             </a:fld>
             <a:endParaRPr lang="en-US" dirty="0"/>
           </a:p>
@@ -2634,7 +2634,7 @@
           <a:p>
             <a:fld id="{92BEA474-078D-4E9B-9B14-09A87B19DC46}" type="datetime1">
               <a:rPr lang="en-US" smtClean="0"/>
-              <a:t>3/11/2020</a:t>
+              <a:t>3/12/2020</a:t>
             </a:fld>
             <a:endParaRPr lang="en-US" dirty="0"/>
           </a:p>
@@ -2984,7 +2984,7 @@
           <a:p>
             <a:fld id="{4907D986-8816-4272-A432-0437A28A9828}" type="datetime1">
               <a:rPr lang="en-US" smtClean="0"/>
-              <a:t>3/11/2020</a:t>
+              <a:t>3/12/2020</a:t>
             </a:fld>
             <a:endParaRPr lang="en-US" dirty="0"/>
           </a:p>
@@ -3245,7 +3245,7 @@
           <a:p>
             <a:fld id="{62D6E202-B606-4609-B914-27C9371A1F6D}" type="datetime1">
               <a:rPr lang="en-US" smtClean="0"/>
-              <a:t>3/11/2020</a:t>
+              <a:t>3/12/2020</a:t>
             </a:fld>
             <a:endParaRPr lang="en-US" dirty="0"/>
           </a:p>
@@ -4154,7 +4154,7 @@
             <a:pPr lvl="0"/>
             <a:r>
               <a:rPr lang="en-US" sz="4000" dirty="0"/>
-              <a:t>Variance refers to how subtyping between more complex types relates to subtyping between their components. For instance, if the type </a:t>
+              <a:t>Subtyping between more complex types relates to subtyping between their components. If type </a:t>
             </a:r>
             <a:r>
               <a:rPr lang="en-US" sz="4000" b="1" i="1" dirty="0"/>
@@ -4166,11 +4166,11 @@
             </a:r>
             <a:r>
               <a:rPr lang="en-US" sz="4000" b="1" i="1" dirty="0"/>
-              <a:t>Animal</a:t>
+              <a:t>Mammal</a:t>
             </a:r>
             <a:r>
               <a:rPr lang="en-US" sz="4000" dirty="0"/>
-              <a:t> , then an expression of type </a:t>
+              <a:t>, then an expression of type </a:t>
             </a:r>
             <a:r>
               <a:rPr lang="en-US" sz="4000" b="1" i="1" dirty="0"/>
@@ -4182,15 +4182,11 @@
             </a:r>
             <a:r>
               <a:rPr lang="en-US" sz="4000" b="1" i="1" dirty="0"/>
-              <a:t>Animal</a:t>
-            </a:r>
-            <a:r>
-              <a:rPr lang="en-US" sz="4000" b="1" i="1" u="sng" dirty="0"/>
-              <a:t> </a:t>
+              <a:t>Mammal</a:t>
             </a:r>
             <a:r>
               <a:rPr lang="en-US" sz="4000" dirty="0"/>
-              <a:t>is used.</a:t>
+              <a:t> is used.</a:t>
             </a:r>
             <a:endParaRPr lang="en-US" sz="2000" i="1" dirty="0">
               <a:solidFill>
@@ -4471,8 +4467,15 @@
             <a:endParaRPr lang="en-US" dirty="0"/>
           </a:p>
           <a:p>
-            <a:r>
-              <a:rPr lang="en-US" dirty="0"/>
+            <a:pPr marL="0" indent="0">
+              <a:buNone/>
+            </a:pPr>
+            <a:r>
+              <a:rPr lang="en-US" dirty="0">
+                <a:highlight>
+                  <a:srgbClr val="FFFF00"/>
+                </a:highlight>
+              </a:rPr>
               <a:t>BOXING is implicit </a:t>
             </a:r>
           </a:p>
@@ -4757,6 +4760,13 @@
               <a:rPr lang="en-US" sz="2000" dirty="0"/>
               <a:t> type from the object.</a:t>
             </a:r>
+            <a:endParaRPr lang="en-US" u="sng" dirty="0"/>
+          </a:p>
+          <a:p>
+            <a:pPr marL="0" indent="0" algn="r">
+              <a:buNone/>
+            </a:pPr>
+            <a:endParaRPr lang="en-US" u="sng" dirty="0"/>
           </a:p>
           <a:p>
             <a:pPr algn="r"/>
@@ -4766,16 +4776,12 @@
             <a:pPr marL="0" indent="0" algn="r">
               <a:buNone/>
             </a:pPr>
-            <a:endParaRPr lang="en-US" u="sng" dirty="0"/>
-          </a:p>
-          <a:p>
-            <a:pPr algn="r"/>
-            <a:endParaRPr lang="en-US" u="sng" dirty="0"/>
-          </a:p>
-          <a:p>
-            <a:pPr algn="r"/>
-            <a:r>
-              <a:rPr lang="en-US" dirty="0"/>
+            <a:r>
+              <a:rPr lang="en-US" dirty="0">
+                <a:highlight>
+                  <a:srgbClr val="FFFF00"/>
+                </a:highlight>
+              </a:rPr>
               <a:t>UNBOXING is explicit</a:t>
             </a:r>
           </a:p>
@@ -4902,8 +4908,8 @@
         </p:blipFill>
         <p:spPr>
           <a:xfrm>
-            <a:off x="7270841" y="4592929"/>
-            <a:ext cx="3884839" cy="1018272"/>
+            <a:off x="6977175" y="4328570"/>
+            <a:ext cx="4178505" cy="1095246"/>
           </a:xfrm>
           <a:prstGeom prst="rect">
             <a:avLst/>

</xml_diff>